<commit_message>
Added app buider user interface lesson
</commit_message>
<xml_diff>
--- a/data/admin/productivity-and-collaboration/pages.pptx
+++ b/data/admin/productivity-and-collaboration/pages.pptx
@@ -203,7 +203,7 @@
           <a:p>
             <a:fld id="{148A6914-CB7E-432F-9F4B-CC7F37DC0438}" type="datetimeFigureOut">
               <a:rPr lang="en-US" smtClean="0"/>
-              <a:t>10/12/2021</a:t>
+              <a:t>10/16/2021</a:t>
             </a:fld>
             <a:endParaRPr lang="en-US"/>
           </a:p>
@@ -601,7 +601,7 @@
           <a:p>
             <a:fld id="{C35190AA-E4B7-45C6-A812-1637583B9BF7}" type="datetimeFigureOut">
               <a:rPr lang="en-US" smtClean="0"/>
-              <a:t>10/12/2021</a:t>
+              <a:t>10/16/2021</a:t>
             </a:fld>
             <a:endParaRPr lang="en-US"/>
           </a:p>
@@ -771,7 +771,7 @@
           <a:p>
             <a:fld id="{C35190AA-E4B7-45C6-A812-1637583B9BF7}" type="datetimeFigureOut">
               <a:rPr lang="en-US" smtClean="0"/>
-              <a:t>10/12/2021</a:t>
+              <a:t>10/16/2021</a:t>
             </a:fld>
             <a:endParaRPr lang="en-US"/>
           </a:p>
@@ -951,7 +951,7 @@
           <a:p>
             <a:fld id="{C35190AA-E4B7-45C6-A812-1637583B9BF7}" type="datetimeFigureOut">
               <a:rPr lang="en-US" smtClean="0"/>
-              <a:t>10/12/2021</a:t>
+              <a:t>10/16/2021</a:t>
             </a:fld>
             <a:endParaRPr lang="en-US"/>
           </a:p>
@@ -1121,7 +1121,7 @@
           <a:p>
             <a:fld id="{C35190AA-E4B7-45C6-A812-1637583B9BF7}" type="datetimeFigureOut">
               <a:rPr lang="en-US" smtClean="0"/>
-              <a:t>10/12/2021</a:t>
+              <a:t>10/16/2021</a:t>
             </a:fld>
             <a:endParaRPr lang="en-US"/>
           </a:p>
@@ -1365,7 +1365,7 @@
           <a:p>
             <a:fld id="{C35190AA-E4B7-45C6-A812-1637583B9BF7}" type="datetimeFigureOut">
               <a:rPr lang="en-US" smtClean="0"/>
-              <a:t>10/12/2021</a:t>
+              <a:t>10/16/2021</a:t>
             </a:fld>
             <a:endParaRPr lang="en-US"/>
           </a:p>
@@ -1597,7 +1597,7 @@
           <a:p>
             <a:fld id="{C35190AA-E4B7-45C6-A812-1637583B9BF7}" type="datetimeFigureOut">
               <a:rPr lang="en-US" smtClean="0"/>
-              <a:t>10/12/2021</a:t>
+              <a:t>10/16/2021</a:t>
             </a:fld>
             <a:endParaRPr lang="en-US"/>
           </a:p>
@@ -1964,7 +1964,7 @@
           <a:p>
             <a:fld id="{C35190AA-E4B7-45C6-A812-1637583B9BF7}" type="datetimeFigureOut">
               <a:rPr lang="en-US" smtClean="0"/>
-              <a:t>10/12/2021</a:t>
+              <a:t>10/16/2021</a:t>
             </a:fld>
             <a:endParaRPr lang="en-US"/>
           </a:p>
@@ -2082,7 +2082,7 @@
           <a:p>
             <a:fld id="{C35190AA-E4B7-45C6-A812-1637583B9BF7}" type="datetimeFigureOut">
               <a:rPr lang="en-US" smtClean="0"/>
-              <a:t>10/12/2021</a:t>
+              <a:t>10/16/2021</a:t>
             </a:fld>
             <a:endParaRPr lang="en-US"/>
           </a:p>
@@ -2177,7 +2177,7 @@
           <a:p>
             <a:fld id="{C35190AA-E4B7-45C6-A812-1637583B9BF7}" type="datetimeFigureOut">
               <a:rPr lang="en-US" smtClean="0"/>
-              <a:t>10/12/2021</a:t>
+              <a:t>10/16/2021</a:t>
             </a:fld>
             <a:endParaRPr lang="en-US"/>
           </a:p>
@@ -2454,7 +2454,7 @@
           <a:p>
             <a:fld id="{C35190AA-E4B7-45C6-A812-1637583B9BF7}" type="datetimeFigureOut">
               <a:rPr lang="en-US" smtClean="0"/>
-              <a:t>10/12/2021</a:t>
+              <a:t>10/16/2021</a:t>
             </a:fld>
             <a:endParaRPr lang="en-US"/>
           </a:p>
@@ -2711,7 +2711,7 @@
           <a:p>
             <a:fld id="{C35190AA-E4B7-45C6-A812-1637583B9BF7}" type="datetimeFigureOut">
               <a:rPr lang="en-US" smtClean="0"/>
-              <a:t>10/12/2021</a:t>
+              <a:t>10/16/2021</a:t>
             </a:fld>
             <a:endParaRPr lang="en-US"/>
           </a:p>
@@ -2924,7 +2924,7 @@
           <a:p>
             <a:fld id="{C35190AA-E4B7-45C6-A812-1637583B9BF7}" type="datetimeFigureOut">
               <a:rPr lang="en-US" smtClean="0"/>
-              <a:t>10/12/2021</a:t>
+              <a:t>10/16/2021</a:t>
             </a:fld>
             <a:endParaRPr lang="en-US"/>
           </a:p>
@@ -4540,7 +4540,7 @@
         <p:spPr>
           <a:xfrm>
             <a:off x="386623" y="1508831"/>
-            <a:ext cx="6540500" cy="6317883"/>
+            <a:ext cx="6540500" cy="7529754"/>
           </a:xfrm>
           <a:prstGeom prst="rect">
             <a:avLst/>
@@ -4832,7 +4832,27 @@
                 <a:ea typeface="Times" panose="02020603050405020304" pitchFamily="18" charset="0"/>
                 <a:cs typeface="Times" panose="02020603050405020304" pitchFamily="18" charset="0"/>
               </a:rPr>
-              <a:t>Lead history related list</a:t>
+              <a:t>Lead history and other related lists</a:t>
+            </a:r>
+          </a:p>
+          <a:p>
+            <a:pPr lvl="1" indent="-171450">
+              <a:lnSpc>
+                <a:spcPct val="150000"/>
+              </a:lnSpc>
+              <a:buFont typeface="Arial" panose="020B0604020202020204" pitchFamily="34" charset="0"/>
+              <a:buChar char="•"/>
+            </a:pPr>
+            <a:r>
+              <a:rPr lang="en-US" sz="1050" dirty="0">
+                <a:solidFill>
+                  <a:srgbClr val="000000"/>
+                </a:solidFill>
+                <a:latin typeface="Avenir Next LT Pro" panose="020B0504020202020204" pitchFamily="34" charset="0"/>
+                <a:ea typeface="Times" panose="02020603050405020304" pitchFamily="18" charset="0"/>
+                <a:cs typeface="Times" panose="02020603050405020304" pitchFamily="18" charset="0"/>
+              </a:rPr>
+              <a:t>Division and territory management  fields</a:t>
             </a:r>
           </a:p>
           <a:p>
@@ -4901,7 +4921,7 @@
                 <a:ea typeface="Times" panose="02020603050405020304" pitchFamily="18" charset="0"/>
                 <a:cs typeface="Times" panose="02020603050405020304" pitchFamily="18" charset="0"/>
               </a:rPr>
-              <a:t>The items in the Navigation Menu can also be reordered by users in the app directly.</a:t>
+              <a:t>The Navigation Menu has a top section, recent section, and an apps section.</a:t>
             </a:r>
           </a:p>
           <a:p>
@@ -4925,7 +4945,88 @@
                 <a:ea typeface="Times" panose="02020603050405020304" pitchFamily="18" charset="0"/>
                 <a:cs typeface="Times" panose="02020603050405020304" pitchFamily="18" charset="0"/>
               </a:rPr>
-              <a:t>Items from the Navigation Menu are displayed in the Navigation Bar.</a:t>
+              <a:t>The items in the Navigation Menu apps section can also be reordered by users in the app directly.</a:t>
+            </a:r>
+          </a:p>
+          <a:p>
+            <a:pPr marR="0">
+              <a:lnSpc>
+                <a:spcPct val="150000"/>
+              </a:lnSpc>
+              <a:spcBef>
+                <a:spcPts val="0"/>
+              </a:spcBef>
+              <a:spcAft>
+                <a:spcPts val="0"/>
+              </a:spcAft>
+            </a:pPr>
+            <a:r>
+              <a:rPr lang="en-US" sz="1050" dirty="0">
+                <a:solidFill>
+                  <a:srgbClr val="000000"/>
+                </a:solidFill>
+                <a:latin typeface="Avenir Next LT Pro" panose="020B0504020202020204" pitchFamily="34" charset="0"/>
+                <a:ea typeface="Times" panose="02020603050405020304" pitchFamily="18" charset="0"/>
+                <a:cs typeface="Times" panose="02020603050405020304" pitchFamily="18" charset="0"/>
+              </a:rPr>
+              <a:t>A tab must be created to add a Lightning component or page to the Navigation Menu.</a:t>
+            </a:r>
+          </a:p>
+          <a:p>
+            <a:pPr marR="0">
+              <a:lnSpc>
+                <a:spcPct val="150000"/>
+              </a:lnSpc>
+              <a:spcBef>
+                <a:spcPts val="0"/>
+              </a:spcBef>
+              <a:spcAft>
+                <a:spcPts val="0"/>
+              </a:spcAft>
+            </a:pPr>
+            <a:endParaRPr lang="en-US" sz="1050" dirty="0">
+              <a:solidFill>
+                <a:srgbClr val="000000"/>
+              </a:solidFill>
+              <a:latin typeface="Avenir Next LT Pro" panose="020B0504020202020204" pitchFamily="34" charset="0"/>
+              <a:ea typeface="Times" panose="02020603050405020304" pitchFamily="18" charset="0"/>
+              <a:cs typeface="Times" panose="02020603050405020304" pitchFamily="18" charset="0"/>
+            </a:endParaRPr>
+          </a:p>
+          <a:p>
+            <a:pPr>
+              <a:lnSpc>
+                <a:spcPct val="150000"/>
+              </a:lnSpc>
+            </a:pPr>
+            <a:r>
+              <a:rPr lang="en-US" sz="1050" dirty="0">
+                <a:solidFill>
+                  <a:srgbClr val="000000"/>
+                </a:solidFill>
+                <a:latin typeface="Avenir Next LT Pro" panose="020B0504020202020204" pitchFamily="34" charset="0"/>
+                <a:ea typeface="Times" panose="02020603050405020304" pitchFamily="18" charset="0"/>
+                <a:cs typeface="Times" panose="02020603050405020304" pitchFamily="18" charset="0"/>
+              </a:rPr>
+              <a:t>On the mobile app home page, the Navigation Bar is the first 4 items from the Navigation Menu.</a:t>
+            </a:r>
+          </a:p>
+          <a:p>
+            <a:pPr>
+              <a:lnSpc>
+                <a:spcPct val="150000"/>
+              </a:lnSpc>
+            </a:pPr>
+            <a:r>
+              <a:rPr lang="en-US" sz="1050" dirty="0">
+                <a:solidFill>
+                  <a:srgbClr val="000000"/>
+                </a:solidFill>
+                <a:latin typeface="Avenir Next LT Pro" panose="020B0504020202020204" pitchFamily="34" charset="0"/>
+                <a:ea typeface="Times" panose="02020603050405020304" pitchFamily="18" charset="0"/>
+                <a:cs typeface="Times" panose="02020603050405020304" pitchFamily="18" charset="0"/>
+              </a:rPr>
+              <a:t>In Lightning mobile apps, the Navigation Bar is the first 4 tabs from the Lightning desktop app.</a:t>
             </a:r>
           </a:p>
           <a:p>

</xml_diff>